<commit_message>
adds slides for electricity primer
</commit_message>
<xml_diff>
--- a/Arduino/Slides/Arduino Introduction.pptx
+++ b/Arduino/Slides/Arduino Introduction.pptx
@@ -7702,8 +7702,8 @@
               <a:t>Analog to Digital </a:t>
             </a:r>
             <a:r>
-              <a:rPr lang="en-US" dirty="0" err="1" smtClean="0"/>
-              <a:t>Coversion</a:t>
+              <a:rPr lang="en-US" dirty="0" smtClean="0"/>
+              <a:t>Conversion</a:t>
             </a:r>
             <a:endParaRPr lang="en-US" dirty="0"/>
           </a:p>

</xml_diff>